<commit_message>
added slopes, update präsi
</commit_message>
<xml_diff>
--- a/Praktikum Produktionstechnik M2.pptx
+++ b/Praktikum Produktionstechnik M2.pptx
@@ -15,6 +15,7 @@
     <p:sldId id="258" r:id="rId9"/>
     <p:sldId id="259" r:id="rId10"/>
     <p:sldId id="265" r:id="rId11"/>
+    <p:sldId id="268" r:id="rId12"/>
   </p:sldIdLst>
   <p:sldSz cx="12192000" cy="6858000"/>
   <p:notesSz cx="6858000" cy="9144000"/>
@@ -470,7 +471,7 @@
       <inkml:brushProperty name="ignorePressure" value="1"/>
     </inkml:brush>
   </inkml:definitions>
-  <inkml:trace contextRef="#ctx0" brushRef="#br0">1 0,'0'47,"0"1647,0-1684</inkml:trace>
+  <inkml:trace contextRef="#ctx0" brushRef="#br0">1 0,'0'8,"0"298,0-304</inkml:trace>
 </inkml:ink>
 </file>
 
@@ -1893,6 +1894,35 @@
     </inkml:brush>
   </inkml:definitions>
   <inkml:trace contextRef="#ctx0" brushRef="#br0">1 1041,'5345'-1039,"-5333"1037</inkml:trace>
+</inkml:ink>
+</file>
+
+<file path=ppt/ink/ink64.xml><?xml version="1.0" encoding="utf-8"?>
+<inkml:ink xmlns:inkml="http://www.w3.org/2003/InkML">
+  <inkml:definitions>
+    <inkml:context xml:id="ctx0">
+      <inkml:inkSource xml:id="inkSrc0">
+        <inkml:traceFormat>
+          <inkml:channel name="X" type="integer" min="-2.14748E9" max="2.14748E9" units="cm"/>
+          <inkml:channel name="Y" type="integer" min="-2.14748E9" max="2.14748E9" units="cm"/>
+        </inkml:traceFormat>
+        <inkml:channelProperties>
+          <inkml:channelProperty channel="X" name="resolution" value="1000" units="1/cm"/>
+          <inkml:channelProperty channel="Y" name="resolution" value="1000" units="1/cm"/>
+        </inkml:channelProperties>
+      </inkml:inkSource>
+      <inkml:timestamp xml:id="ts0" timeString="2019-05-28T06:44:28.396"/>
+    </inkml:context>
+    <inkml:brush xml:id="br0">
+      <inkml:brushProperty name="width" value="0.1" units="cm"/>
+      <inkml:brushProperty name="height" value="0.2" units="cm"/>
+      <inkml:brushProperty name="color" value="#FFFC00"/>
+      <inkml:brushProperty name="tip" value="rectangle"/>
+      <inkml:brushProperty name="rasterOp" value="maskPen"/>
+      <inkml:brushProperty name="ignorePressure" value="1"/>
+    </inkml:brush>
+  </inkml:definitions>
+  <inkml:trace contextRef="#ctx0" brushRef="#br0">1 960,'14'-2,"5859"-928,-5715 905,-143 22</inkml:trace>
 </inkml:ink>
 </file>
 
@@ -5989,6 +6019,145 @@
 </p:sld>
 </file>
 
+<file path=ppt/slides/slide11.xml><?xml version="1.0" encoding="utf-8"?>
+<p:sld xmlns:a="http://schemas.openxmlformats.org/drawingml/2006/main" xmlns:r="http://schemas.openxmlformats.org/officeDocument/2006/relationships" xmlns:p="http://schemas.openxmlformats.org/presentationml/2006/main">
+  <p:cSld>
+    <p:spTree>
+      <p:nvGrpSpPr>
+        <p:cNvPr id="1" name=""/>
+        <p:cNvGrpSpPr/>
+        <p:nvPr/>
+      </p:nvGrpSpPr>
+      <p:grpSpPr>
+        <a:xfrm>
+          <a:off x="0" y="0"/>
+          <a:ext cx="0" cy="0"/>
+          <a:chOff x="0" y="0"/>
+          <a:chExt cx="0" cy="0"/>
+        </a:xfrm>
+      </p:grpSpPr>
+      <p:pic>
+        <p:nvPicPr>
+          <p:cNvPr id="15" name="Grafik 14">
+            <a:extLst>
+              <a:ext uri="{FF2B5EF4-FFF2-40B4-BE49-F238E27FC236}">
+                <a16:creationId xmlns:a16="http://schemas.microsoft.com/office/drawing/2014/main" id="{25E111DB-420D-4F5C-9703-472BFF9F4B2D}"/>
+              </a:ext>
+            </a:extLst>
+          </p:cNvPr>
+          <p:cNvPicPr>
+            <a:picLocks noChangeAspect="1"/>
+          </p:cNvPicPr>
+          <p:nvPr/>
+        </p:nvPicPr>
+        <p:blipFill rotWithShape="1">
+          <a:blip r:embed="rId2">
+            <a:extLst>
+              <a:ext uri="{28A0092B-C50C-407E-A947-70E740481C1C}">
+                <a14:useLocalDpi xmlns:a14="http://schemas.microsoft.com/office/drawing/2010/main" val="0"/>
+              </a:ext>
+            </a:extLst>
+          </a:blip>
+          <a:srcRect t="6465" r="190"/>
+          <a:stretch/>
+        </p:blipFill>
+        <p:spPr>
+          <a:xfrm>
+            <a:off x="-2853429" y="-1422251"/>
+            <a:ext cx="16080484" cy="9308363"/>
+          </a:xfrm>
+          <a:prstGeom prst="rect">
+            <a:avLst/>
+          </a:prstGeom>
+        </p:spPr>
+      </p:pic>
+      <p:sp>
+        <p:nvSpPr>
+          <p:cNvPr id="2" name="Titel 1">
+            <a:extLst>
+              <a:ext uri="{FF2B5EF4-FFF2-40B4-BE49-F238E27FC236}">
+                <a16:creationId xmlns:a16="http://schemas.microsoft.com/office/drawing/2014/main" id="{E0634C32-AA0C-4143-AD46-701C699F497F}"/>
+              </a:ext>
+            </a:extLst>
+          </p:cNvPr>
+          <p:cNvSpPr>
+            <a:spLocks noGrp="1"/>
+          </p:cNvSpPr>
+          <p:nvPr>
+            <p:ph type="ctrTitle"/>
+          </p:nvPr>
+        </p:nvSpPr>
+        <p:spPr>
+          <a:xfrm>
+            <a:off x="1214088" y="4833821"/>
+            <a:ext cx="8899953" cy="1834056"/>
+          </a:xfrm>
+        </p:spPr>
+        <p:txBody>
+          <a:bodyPr>
+            <a:normAutofit/>
+          </a:bodyPr>
+          <a:lstStyle/>
+          <a:p>
+            <a:r>
+              <a:rPr lang="de-DE" sz="3700" dirty="0"/>
+              <a:t>Danke für die Aufmerksamkeit</a:t>
+            </a:r>
+          </a:p>
+        </p:txBody>
+      </p:sp>
+      <p:pic>
+        <p:nvPicPr>
+          <p:cNvPr id="28" name="Grafik 27" descr="Logo Ingenieursinformatik">
+            <a:extLst>
+              <a:ext uri="{FF2B5EF4-FFF2-40B4-BE49-F238E27FC236}">
+                <a16:creationId xmlns:a16="http://schemas.microsoft.com/office/drawing/2014/main" id="{6071549F-5F13-41F0-8056-F056D7C51C54}"/>
+              </a:ext>
+            </a:extLst>
+          </p:cNvPr>
+          <p:cNvPicPr/>
+          <p:nvPr/>
+        </p:nvPicPr>
+        <p:blipFill>
+          <a:blip r:embed="rId3" cstate="print">
+            <a:extLst>
+              <a:ext uri="{28A0092B-C50C-407E-A947-70E740481C1C}">
+                <a14:useLocalDpi xmlns:a14="http://schemas.microsoft.com/office/drawing/2010/main" val="0"/>
+              </a:ext>
+            </a:extLst>
+          </a:blip>
+          <a:srcRect/>
+          <a:stretch>
+            <a:fillRect/>
+          </a:stretch>
+        </p:blipFill>
+        <p:spPr bwMode="auto">
+          <a:xfrm>
+            <a:off x="10181907" y="256796"/>
+            <a:ext cx="1692155" cy="924304"/>
+          </a:xfrm>
+          <a:prstGeom prst="rect">
+            <a:avLst/>
+          </a:prstGeom>
+          <a:noFill/>
+          <a:ln>
+            <a:noFill/>
+          </a:ln>
+        </p:spPr>
+      </p:pic>
+    </p:spTree>
+    <p:extLst>
+      <p:ext uri="{BB962C8B-B14F-4D97-AF65-F5344CB8AC3E}">
+        <p14:creationId xmlns:p14="http://schemas.microsoft.com/office/powerpoint/2010/main" val="4200603737"/>
+      </p:ext>
+    </p:extLst>
+  </p:cSld>
+  <p:clrMapOvr>
+    <a:masterClrMapping/>
+  </p:clrMapOvr>
+</p:sld>
+</file>
+
 <file path=ppt/slides/slide2.xml><?xml version="1.0" encoding="utf-8"?>
 <p:sld xmlns:a="http://schemas.openxmlformats.org/drawingml/2006/main" xmlns:r="http://schemas.openxmlformats.org/officeDocument/2006/relationships" xmlns:p="http://schemas.openxmlformats.org/presentationml/2006/main">
   <p:cSld>
@@ -6563,7 +6732,7 @@
             <p:ph idx="1"/>
             <p:extLst>
               <p:ext uri="{D42A27DB-BD31-4B8C-83A1-F6EECF244321}">
-                <p14:modId xmlns:p14="http://schemas.microsoft.com/office/powerpoint/2010/main" val="314332833"/>
+                <p14:modId xmlns:p14="http://schemas.microsoft.com/office/powerpoint/2010/main" val="1072494817"/>
               </p:ext>
             </p:extLst>
           </p:nvPr>
@@ -7455,7 +7624,10 @@
                     <a:bodyPr/>
                     <a:lstStyle/>
                     <a:p>
-                      <a:endParaRPr lang="de-DE" dirty="0"/>
+                      <a:r>
+                        <a:rPr lang="de-DE" dirty="0"/>
+                        <a:t>Autonom</a:t>
+                      </a:r>
                     </a:p>
                   </a:txBody>
                   <a:tcPr/>
@@ -7667,7 +7839,10 @@
                     <a:bodyPr/>
                     <a:lstStyle/>
                     <a:p>
-                      <a:endParaRPr lang="de-DE" dirty="0"/>
+                      <a:r>
+                        <a:rPr lang="de-DE" dirty="0"/>
+                        <a:t>Encoder</a:t>
+                      </a:r>
                     </a:p>
                   </a:txBody>
                   <a:tcPr/>
@@ -7762,7 +7937,7 @@
                       </a:pPr>
                       <a:r>
                         <a:rPr lang="de-DE" dirty="0"/>
-                        <a:t>ABS</a:t>
+                        <a:t>Holz</a:t>
                       </a:r>
                     </a:p>
                   </a:txBody>
@@ -7773,9 +7948,26 @@
                     <a:bodyPr/>
                     <a:lstStyle/>
                     <a:p>
+                      <a:pPr marL="0" marR="0" lvl="0" indent="0" algn="l" defTabSz="914400" rtl="0" eaLnBrk="1" fontAlgn="auto" latinLnBrk="0" hangingPunct="1">
+                        <a:lnSpc>
+                          <a:spcPct val="100000"/>
+                        </a:lnSpc>
+                        <a:spcBef>
+                          <a:spcPts val="0"/>
+                        </a:spcBef>
+                        <a:spcAft>
+                          <a:spcPts val="0"/>
+                        </a:spcAft>
+                        <a:buClrTx/>
+                        <a:buSzTx/>
+                        <a:buFontTx/>
+                        <a:buNone/>
+                        <a:tabLst/>
+                        <a:defRPr/>
+                      </a:pPr>
                       <a:r>
                         <a:rPr lang="de-DE" dirty="0"/>
-                        <a:t>Holz</a:t>
+                        <a:t>ABS</a:t>
                       </a:r>
                     </a:p>
                   </a:txBody>
@@ -8019,8 +8211,8 @@
           </p:pic>
         </mc:Fallback>
       </mc:AlternateContent>
-      <mc:AlternateContent xmlns:mc="http://schemas.openxmlformats.org/markup-compatibility/2006" xmlns:p14="http://schemas.microsoft.com/office/powerpoint/2010/main">
-        <mc:Choice Requires="p14">
+      <mc:AlternateContent xmlns:mc="http://schemas.openxmlformats.org/markup-compatibility/2006">
+        <mc:Choice xmlns:p14="http://schemas.microsoft.com/office/powerpoint/2010/main" Requires="p14">
           <p:contentPart p14:bwMode="auto" r:id="rId5">
             <p14:nvContentPartPr>
               <p14:cNvPr id="22" name="Freihand 21">
@@ -8034,12 +8226,12 @@
               <p14:nvPr/>
             </p14:nvContentPartPr>
             <p14:xfrm>
-              <a:off x="6077674" y="1886407"/>
-              <a:ext cx="360" cy="630360"/>
+              <a:off x="6077674" y="2403137"/>
+              <a:ext cx="360" cy="113629"/>
             </p14:xfrm>
           </p:contentPart>
         </mc:Choice>
-        <mc:Fallback xmlns="">
+        <mc:Fallback>
           <p:pic>
             <p:nvPicPr>
               <p:cNvPr id="22" name="Freihand 21">
@@ -8053,15 +8245,15 @@
               <p:nvPr/>
             </p:nvPicPr>
             <p:blipFill>
-              <a:blip r:embed="rId10"/>
+              <a:blip r:embed="rId6"/>
               <a:stretch>
                 <a:fillRect/>
               </a:stretch>
             </p:blipFill>
             <p:spPr>
               <a:xfrm>
-                <a:off x="6060034" y="1850407"/>
-                <a:ext cx="36000" cy="702000"/>
+                <a:off x="6059674" y="2367292"/>
+                <a:ext cx="36000" cy="184961"/>
               </a:xfrm>
               <a:prstGeom prst="rect">
                 <a:avLst/>
@@ -8072,7 +8264,7 @@
       </mc:AlternateContent>
       <mc:AlternateContent xmlns:mc="http://schemas.openxmlformats.org/markup-compatibility/2006" xmlns:p14="http://schemas.microsoft.com/office/powerpoint/2010/main">
         <mc:Choice Requires="p14">
-          <p:contentPart p14:bwMode="auto" r:id="rId11">
+          <p:contentPart p14:bwMode="auto" r:id="rId7">
             <p14:nvContentPartPr>
               <p14:cNvPr id="23" name="Freihand 22">
                 <a:extLst>
@@ -8172,8 +8364,8 @@
           </p:pic>
         </mc:Fallback>
       </mc:AlternateContent>
-      <mc:AlternateContent xmlns:mc="http://schemas.openxmlformats.org/markup-compatibility/2006" xmlns:p14="http://schemas.microsoft.com/office/powerpoint/2010/main">
-        <mc:Choice Requires="p14">
+      <mc:AlternateContent xmlns:mc="http://schemas.openxmlformats.org/markup-compatibility/2006">
+        <mc:Choice xmlns:p14="http://schemas.microsoft.com/office/powerpoint/2010/main" Requires="p14">
           <p:contentPart p14:bwMode="auto" r:id="rId17">
             <p14:nvContentPartPr>
               <p14:cNvPr id="26" name="Freihand 25">
@@ -8187,12 +8379,12 @@
               <p14:nvPr/>
             </p14:nvContentPartPr>
             <p14:xfrm>
-              <a:off x="6017554" y="1990087"/>
+              <a:off x="8261525" y="1981368"/>
               <a:ext cx="117360" cy="100080"/>
             </p14:xfrm>
           </p:contentPart>
         </mc:Choice>
-        <mc:Fallback xmlns="">
+        <mc:Fallback>
           <p:pic>
             <p:nvPicPr>
               <p:cNvPr id="26" name="Freihand 25">
@@ -8213,7 +8405,7 @@
             </p:blipFill>
             <p:spPr>
               <a:xfrm>
-                <a:off x="5999554" y="1954447"/>
+                <a:off x="8243525" y="1945368"/>
                 <a:ext cx="153000" cy="171720"/>
               </a:xfrm>
               <a:prstGeom prst="rect">
@@ -8325,8 +8517,8 @@
           </p:pic>
         </mc:Fallback>
       </mc:AlternateContent>
-      <mc:AlternateContent xmlns:mc="http://schemas.openxmlformats.org/markup-compatibility/2006">
-        <mc:Choice xmlns:p14="http://schemas.microsoft.com/office/powerpoint/2010/main" Requires="p14">
+      <mc:AlternateContent xmlns:mc="http://schemas.openxmlformats.org/markup-compatibility/2006" xmlns:p14="http://schemas.microsoft.com/office/powerpoint/2010/main">
+        <mc:Choice Requires="p14">
           <p:contentPart p14:bwMode="auto" r:id="rId23">
             <p14:nvContentPartPr>
               <p14:cNvPr id="6" name="Freihand 5">
@@ -8345,7 +8537,7 @@
             </p14:xfrm>
           </p:contentPart>
         </mc:Choice>
-        <mc:Fallback>
+        <mc:Fallback xmlns="">
           <p:pic>
             <p:nvPicPr>
               <p:cNvPr id="6" name="Freihand 5">
@@ -8478,8 +8670,8 @@
           </p:pic>
         </mc:Fallback>
       </mc:AlternateContent>
-      <mc:AlternateContent xmlns:mc="http://schemas.openxmlformats.org/markup-compatibility/2006">
-        <mc:Choice xmlns:p14="http://schemas.microsoft.com/office/powerpoint/2010/main" Requires="p14">
+      <mc:AlternateContent xmlns:mc="http://schemas.openxmlformats.org/markup-compatibility/2006" xmlns:p14="http://schemas.microsoft.com/office/powerpoint/2010/main">
+        <mc:Choice Requires="p14">
           <p:contentPart p14:bwMode="auto" r:id="rId33">
             <p14:nvContentPartPr>
               <p14:cNvPr id="14" name="Freihand 13">
@@ -8498,7 +8690,7 @@
             </p14:xfrm>
           </p:contentPart>
         </mc:Choice>
-        <mc:Fallback>
+        <mc:Fallback xmlns="">
           <p:pic>
             <p:nvPicPr>
               <p:cNvPr id="14" name="Freihand 13">
@@ -10824,8 +11016,8 @@
           </p:pic>
         </mc:Fallback>
       </mc:AlternateContent>
-      <mc:AlternateContent xmlns:mc="http://schemas.openxmlformats.org/markup-compatibility/2006">
-        <mc:Choice xmlns:p14="http://schemas.microsoft.com/office/powerpoint/2010/main" Requires="p14">
+      <mc:AlternateContent xmlns:mc="http://schemas.openxmlformats.org/markup-compatibility/2006" xmlns:p14="http://schemas.microsoft.com/office/powerpoint/2010/main">
+        <mc:Choice Requires="p14">
           <p:contentPart p14:bwMode="auto" r:id="rId137">
             <p14:nvContentPartPr>
               <p14:cNvPr id="24" name="Freihand 23">
@@ -10844,7 +11036,7 @@
             </p14:xfrm>
           </p:contentPart>
         </mc:Choice>
-        <mc:Fallback>
+        <mc:Fallback xmlns="">
           <p:pic>
             <p:nvPicPr>
               <p:cNvPr id="24" name="Freihand 23">
@@ -10875,8 +11067,8 @@
           </p:pic>
         </mc:Fallback>
       </mc:AlternateContent>
-      <mc:AlternateContent xmlns:mc="http://schemas.openxmlformats.org/markup-compatibility/2006">
-        <mc:Choice xmlns:p14="http://schemas.microsoft.com/office/powerpoint/2010/main" Requires="p14">
+      <mc:AlternateContent xmlns:mc="http://schemas.openxmlformats.org/markup-compatibility/2006" xmlns:p14="http://schemas.microsoft.com/office/powerpoint/2010/main">
+        <mc:Choice Requires="p14">
           <p:contentPart p14:bwMode="auto" r:id="rId139">
             <p14:nvContentPartPr>
               <p14:cNvPr id="103" name="Freihand 102">
@@ -10895,7 +11087,7 @@
             </p14:xfrm>
           </p:contentPart>
         </mc:Choice>
-        <mc:Fallback>
+        <mc:Fallback xmlns="">
           <p:pic>
             <p:nvPicPr>
               <p:cNvPr id="103" name="Freihand 102">
@@ -10926,8 +11118,8 @@
           </p:pic>
         </mc:Fallback>
       </mc:AlternateContent>
-      <mc:AlternateContent xmlns:mc="http://schemas.openxmlformats.org/markup-compatibility/2006">
-        <mc:Choice xmlns:p14="http://schemas.microsoft.com/office/powerpoint/2010/main" Requires="p14">
+      <mc:AlternateContent xmlns:mc="http://schemas.openxmlformats.org/markup-compatibility/2006" xmlns:p14="http://schemas.microsoft.com/office/powerpoint/2010/main">
+        <mc:Choice Requires="p14">
           <p:contentPart p14:bwMode="auto" r:id="rId141">
             <p14:nvContentPartPr>
               <p14:cNvPr id="104" name="Freihand 103">
@@ -10946,7 +11138,7 @@
             </p14:xfrm>
           </p:contentPart>
         </mc:Choice>
-        <mc:Fallback>
+        <mc:Fallback xmlns="">
           <p:pic>
             <p:nvPicPr>
               <p:cNvPr id="104" name="Freihand 103">
@@ -10977,8 +11169,8 @@
           </p:pic>
         </mc:Fallback>
       </mc:AlternateContent>
-      <mc:AlternateContent xmlns:mc="http://schemas.openxmlformats.org/markup-compatibility/2006">
-        <mc:Choice xmlns:p14="http://schemas.microsoft.com/office/powerpoint/2010/main" Requires="p14">
+      <mc:AlternateContent xmlns:mc="http://schemas.openxmlformats.org/markup-compatibility/2006" xmlns:p14="http://schemas.microsoft.com/office/powerpoint/2010/main">
+        <mc:Choice Requires="p14">
           <p:contentPart p14:bwMode="auto" r:id="rId143">
             <p14:nvContentPartPr>
               <p14:cNvPr id="11" name="Freihand 10">
@@ -10997,7 +11189,7 @@
             </p14:xfrm>
           </p:contentPart>
         </mc:Choice>
-        <mc:Fallback>
+        <mc:Fallback xmlns="">
           <p:pic>
             <p:nvPicPr>
               <p:cNvPr id="11" name="Freihand 10">
@@ -11028,8 +11220,8 @@
           </p:pic>
         </mc:Fallback>
       </mc:AlternateContent>
-      <mc:AlternateContent xmlns:mc="http://schemas.openxmlformats.org/markup-compatibility/2006">
-        <mc:Choice xmlns:p14="http://schemas.microsoft.com/office/powerpoint/2010/main" Requires="p14">
+      <mc:AlternateContent xmlns:mc="http://schemas.openxmlformats.org/markup-compatibility/2006" xmlns:p14="http://schemas.microsoft.com/office/powerpoint/2010/main">
+        <mc:Choice Requires="p14">
           <p:contentPart p14:bwMode="auto" r:id="rId145">
             <p14:nvContentPartPr>
               <p14:cNvPr id="105" name="Freihand 104">
@@ -11048,7 +11240,7 @@
             </p14:xfrm>
           </p:contentPart>
         </mc:Choice>
-        <mc:Fallback>
+        <mc:Fallback xmlns="">
           <p:pic>
             <p:nvPicPr>
               <p:cNvPr id="105" name="Freihand 104">
@@ -11079,8 +11271,8 @@
           </p:pic>
         </mc:Fallback>
       </mc:AlternateContent>
-      <mc:AlternateContent xmlns:mc="http://schemas.openxmlformats.org/markup-compatibility/2006">
-        <mc:Choice xmlns:p14="http://schemas.microsoft.com/office/powerpoint/2010/main" Requires="p14">
+      <mc:AlternateContent xmlns:mc="http://schemas.openxmlformats.org/markup-compatibility/2006" xmlns:p14="http://schemas.microsoft.com/office/powerpoint/2010/main">
+        <mc:Choice Requires="p14">
           <p:contentPart p14:bwMode="auto" r:id="rId147">
             <p14:nvContentPartPr>
               <p14:cNvPr id="15" name="Freihand 14">
@@ -11099,7 +11291,7 @@
             </p14:xfrm>
           </p:contentPart>
         </mc:Choice>
-        <mc:Fallback>
+        <mc:Fallback xmlns="">
           <p:pic>
             <p:nvPicPr>
               <p:cNvPr id="15" name="Freihand 14">
@@ -11130,8 +11322,8 @@
           </p:pic>
         </mc:Fallback>
       </mc:AlternateContent>
-      <mc:AlternateContent xmlns:mc="http://schemas.openxmlformats.org/markup-compatibility/2006">
-        <mc:Choice xmlns:p14="http://schemas.microsoft.com/office/powerpoint/2010/main" Requires="p14">
+      <mc:AlternateContent xmlns:mc="http://schemas.openxmlformats.org/markup-compatibility/2006" xmlns:p14="http://schemas.microsoft.com/office/powerpoint/2010/main">
+        <mc:Choice Requires="p14">
           <p:contentPart p14:bwMode="auto" r:id="rId149">
             <p14:nvContentPartPr>
               <p14:cNvPr id="70" name="Freihand 69">
@@ -11150,7 +11342,7 @@
             </p14:xfrm>
           </p:contentPart>
         </mc:Choice>
-        <mc:Fallback>
+        <mc:Fallback xmlns="">
           <p:pic>
             <p:nvPicPr>
               <p:cNvPr id="70" name="Freihand 69">
@@ -11173,6 +11365,57 @@
               <a:xfrm>
                 <a:off x="3651729" y="5725969"/>
                 <a:ext cx="1964520" cy="446760"/>
+              </a:xfrm>
+              <a:prstGeom prst="rect">
+                <a:avLst/>
+              </a:prstGeom>
+            </p:spPr>
+          </p:pic>
+        </mc:Fallback>
+      </mc:AlternateContent>
+      <mc:AlternateContent xmlns:mc="http://schemas.openxmlformats.org/markup-compatibility/2006">
+        <mc:Choice xmlns:p14="http://schemas.microsoft.com/office/powerpoint/2010/main" Requires="p14">
+          <p:contentPart p14:bwMode="auto" r:id="rId151">
+            <p14:nvContentPartPr>
+              <p14:cNvPr id="72" name="Freihand 71">
+                <a:extLst>
+                  <a:ext uri="{FF2B5EF4-FFF2-40B4-BE49-F238E27FC236}">
+                    <a16:creationId xmlns:a16="http://schemas.microsoft.com/office/drawing/2014/main" id="{27255B57-CCAA-4F41-8D8A-F2392A5BEA38}"/>
+                  </a:ext>
+                </a:extLst>
+              </p14:cNvPr>
+              <p14:cNvContentPartPr/>
+              <p14:nvPr/>
+            </p14:nvContentPartPr>
+            <p14:xfrm>
+              <a:off x="6117972" y="2043801"/>
+              <a:ext cx="2182320" cy="345960"/>
+            </p14:xfrm>
+          </p:contentPart>
+        </mc:Choice>
+        <mc:Fallback>
+          <p:pic>
+            <p:nvPicPr>
+              <p:cNvPr id="72" name="Freihand 71">
+                <a:extLst>
+                  <a:ext uri="{FF2B5EF4-FFF2-40B4-BE49-F238E27FC236}">
+                    <a16:creationId xmlns:a16="http://schemas.microsoft.com/office/drawing/2014/main" id="{27255B57-CCAA-4F41-8D8A-F2392A5BEA38}"/>
+                  </a:ext>
+                </a:extLst>
+              </p:cNvPr>
+              <p:cNvPicPr/>
+              <p:nvPr/>
+            </p:nvPicPr>
+            <p:blipFill>
+              <a:blip r:embed="rId152"/>
+              <a:stretch>
+                <a:fillRect/>
+              </a:stretch>
+            </p:blipFill>
+            <p:spPr>
+              <a:xfrm>
+                <a:off x="6100332" y="2007801"/>
+                <a:ext cx="2217960" cy="417600"/>
               </a:xfrm>
               <a:prstGeom prst="rect">
                 <a:avLst/>
@@ -11225,7 +11468,7 @@
                                           </p:stCondLst>
                                         </p:cTn>
                                         <p:tgtEl>
-                                          <p:spTgt spid="78"/>
+                                          <p:spTgt spid="66"/>
                                         </p:tgtEl>
                                         <p:attrNameLst>
                                           <p:attrName>style.visibility</p:attrName>
@@ -11252,7 +11495,7 @@
                                           </p:stCondLst>
                                         </p:cTn>
                                         <p:tgtEl>
-                                          <p:spTgt spid="7"/>
+                                          <p:spTgt spid="31"/>
                                         </p:tgtEl>
                                         <p:attrNameLst>
                                           <p:attrName>style.visibility</p:attrName>
@@ -11279,7 +11522,7 @@
                                           </p:stCondLst>
                                         </p:cTn>
                                         <p:tgtEl>
-                                          <p:spTgt spid="76"/>
+                                          <p:spTgt spid="64"/>
                                         </p:tgtEl>
                                         <p:attrNameLst>
                                           <p:attrName>style.visibility</p:attrName>
@@ -11306,7 +11549,7 @@
                                           </p:stCondLst>
                                         </p:cTn>
                                         <p:tgtEl>
-                                          <p:spTgt spid="77"/>
+                                          <p:spTgt spid="30"/>
                                         </p:tgtEl>
                                         <p:attrNameLst>
                                           <p:attrName>style.visibility</p:attrName>
@@ -11333,7 +11576,7 @@
                                           </p:stCondLst>
                                         </p:cTn>
                                         <p:tgtEl>
-                                          <p:spTgt spid="79"/>
+                                          <p:spTgt spid="65"/>
                                         </p:tgtEl>
                                         <p:attrNameLst>
                                           <p:attrName>style.visibility</p:attrName>
@@ -11360,7 +11603,7 @@
                                           </p:stCondLst>
                                         </p:cTn>
                                         <p:tgtEl>
-                                          <p:spTgt spid="74"/>
+                                          <p:spTgt spid="29"/>
                                         </p:tgtEl>
                                         <p:attrNameLst>
                                           <p:attrName>style.visibility</p:attrName>
@@ -11387,7 +11630,7 @@
                                           </p:stCondLst>
                                         </p:cTn>
                                         <p:tgtEl>
-                                          <p:spTgt spid="80"/>
+                                          <p:spTgt spid="20"/>
                                         </p:tgtEl>
                                         <p:attrNameLst>
                                           <p:attrName>style.visibility</p:attrName>
@@ -11414,7 +11657,7 @@
                                           </p:stCondLst>
                                         </p:cTn>
                                         <p:tgtEl>
-                                          <p:spTgt spid="73"/>
+                                          <p:spTgt spid="19"/>
                                         </p:tgtEl>
                                         <p:attrNameLst>
                                           <p:attrName>style.visibility</p:attrName>
@@ -11441,7 +11684,7 @@
                                           </p:stCondLst>
                                         </p:cTn>
                                         <p:tgtEl>
-                                          <p:spTgt spid="8"/>
+                                          <p:spTgt spid="18"/>
                                         </p:tgtEl>
                                         <p:attrNameLst>
                                           <p:attrName>style.visibility</p:attrName>
@@ -11468,7 +11711,7 @@
                                           </p:stCondLst>
                                         </p:cTn>
                                         <p:tgtEl>
-                                          <p:spTgt spid="81"/>
+                                          <p:spTgt spid="12"/>
                                         </p:tgtEl>
                                         <p:attrNameLst>
                                           <p:attrName>style.visibility</p:attrName>
@@ -11495,7 +11738,7 @@
                                           </p:stCondLst>
                                         </p:cTn>
                                         <p:tgtEl>
-                                          <p:spTgt spid="82"/>
+                                          <p:spTgt spid="16"/>
                                         </p:tgtEl>
                                         <p:attrNameLst>
                                           <p:attrName>style.visibility</p:attrName>
@@ -11522,7 +11765,7 @@
                                           </p:stCondLst>
                                         </p:cTn>
                                         <p:tgtEl>
-                                          <p:spTgt spid="3"/>
+                                          <p:spTgt spid="14"/>
                                         </p:tgtEl>
                                         <p:attrNameLst>
                                           <p:attrName>style.visibility</p:attrName>
@@ -11549,7 +11792,7 @@
                                           </p:stCondLst>
                                         </p:cTn>
                                         <p:tgtEl>
-                                          <p:spTgt spid="9"/>
+                                          <p:spTgt spid="6"/>
                                         </p:tgtEl>
                                         <p:attrNameLst>
                                           <p:attrName>style.visibility</p:attrName>
@@ -11576,7 +11819,7 @@
                                           </p:stCondLst>
                                         </p:cTn>
                                         <p:tgtEl>
-                                          <p:spTgt spid="17"/>
+                                          <p:spTgt spid="13"/>
                                         </p:tgtEl>
                                         <p:attrNameLst>
                                           <p:attrName>style.visibility</p:attrName>
@@ -11603,7 +11846,7 @@
                                           </p:stCondLst>
                                         </p:cTn>
                                         <p:tgtEl>
-                                          <p:spTgt spid="67"/>
+                                          <p:spTgt spid="23"/>
                                         </p:tgtEl>
                                         <p:attrNameLst>
                                           <p:attrName>style.visibility</p:attrName>
@@ -11630,7 +11873,7 @@
                                           </p:stCondLst>
                                         </p:cTn>
                                         <p:tgtEl>
-                                          <p:spTgt spid="68"/>
+                                          <p:spTgt spid="28"/>
                                         </p:tgtEl>
                                         <p:attrNameLst>
                                           <p:attrName>style.visibility</p:attrName>
@@ -11657,7 +11900,7 @@
                                           </p:stCondLst>
                                         </p:cTn>
                                         <p:tgtEl>
-                                          <p:spTgt spid="85"/>
+                                          <p:spTgt spid="27"/>
                                         </p:tgtEl>
                                         <p:attrNameLst>
                                           <p:attrName>style.visibility</p:attrName>
@@ -11684,11 +11927,7 @@
                                           </p:stCondLst>
                                         </p:cTn>
                                         <p:tgtEl>
-                                          <p:spTgt spid="21">
-                                            <p:txEl>
-                                              <p:pRg st="0" end="0"/>
-                                            </p:txEl>
-                                          </p:spTgt>
+                                          <p:spTgt spid="25"/>
                                         </p:tgtEl>
                                         <p:attrNameLst>
                                           <p:attrName>style.visibility</p:attrName>
@@ -11715,7 +11954,7 @@
                                           </p:stCondLst>
                                         </p:cTn>
                                         <p:tgtEl>
-                                          <p:spTgt spid="15"/>
+                                          <p:spTgt spid="26"/>
                                         </p:tgtEl>
                                         <p:attrNameLst>
                                           <p:attrName>style.visibility</p:attrName>
@@ -11742,7 +11981,7 @@
                                           </p:stCondLst>
                                         </p:cTn>
                                         <p:tgtEl>
-                                          <p:spTgt spid="11"/>
+                                          <p:spTgt spid="22"/>
                                         </p:tgtEl>
                                         <p:attrNameLst>
                                           <p:attrName>style.visibility</p:attrName>
@@ -11769,7 +12008,7 @@
                                           </p:stCondLst>
                                         </p:cTn>
                                         <p:tgtEl>
-                                          <p:spTgt spid="70"/>
+                                          <p:spTgt spid="24"/>
                                         </p:tgtEl>
                                         <p:attrNameLst>
                                           <p:attrName>style.visibility</p:attrName>
@@ -11796,7 +12035,7 @@
                                           </p:stCondLst>
                                         </p:cTn>
                                         <p:tgtEl>
-                                          <p:spTgt spid="105"/>
+                                          <p:spTgt spid="104"/>
                                         </p:tgtEl>
                                         <p:attrNameLst>
                                           <p:attrName>style.visibility</p:attrName>
@@ -11809,26 +12048,35 @@
                                   </p:childTnLst>
                                 </p:cTn>
                               </p:par>
-                            </p:childTnLst>
-                          </p:cTn>
-                        </p:par>
-                      </p:childTnLst>
-                    </p:cTn>
-                  </p:par>
-                  <p:par>
-                    <p:cTn id="49" fill="hold">
-                      <p:stCondLst>
-                        <p:cond delay="indefinite"/>
-                      </p:stCondLst>
-                      <p:childTnLst>
-                        <p:par>
-                          <p:cTn id="50" fill="hold">
-                            <p:stCondLst>
-                              <p:cond delay="0"/>
-                            </p:stCondLst>
-                            <p:childTnLst>
                               <p:par>
-                                <p:cTn id="51" presetID="1" presetClass="entr" presetSubtype="0" fill="hold" nodeType="clickEffect">
+                                <p:cTn id="49" presetID="1" presetClass="entr" presetSubtype="0" fill="hold" nodeType="withEffect">
+                                  <p:stCondLst>
+                                    <p:cond delay="0"/>
+                                  </p:stCondLst>
+                                  <p:childTnLst>
+                                    <p:set>
+                                      <p:cBhvr>
+                                        <p:cTn id="50" dur="1" fill="hold">
+                                          <p:stCondLst>
+                                            <p:cond delay="0"/>
+                                          </p:stCondLst>
+                                        </p:cTn>
+                                        <p:tgtEl>
+                                          <p:spTgt spid="103"/>
+                                        </p:tgtEl>
+                                        <p:attrNameLst>
+                                          <p:attrName>style.visibility</p:attrName>
+                                        </p:attrNameLst>
+                                      </p:cBhvr>
+                                      <p:to>
+                                        <p:strVal val="visible"/>
+                                      </p:to>
+                                    </p:set>
+                                  </p:childTnLst>
+                                </p:cTn>
+                              </p:par>
+                              <p:par>
+                                <p:cTn id="51" presetID="1" presetClass="entr" presetSubtype="0" fill="hold" nodeType="withEffect">
                                   <p:stCondLst>
                                     <p:cond delay="0"/>
                                   </p:stCondLst>
@@ -11841,7 +12089,7 @@
                                           </p:stCondLst>
                                         </p:cTn>
                                         <p:tgtEl>
-                                          <p:spTgt spid="66"/>
+                                          <p:spTgt spid="72"/>
                                         </p:tgtEl>
                                         <p:attrNameLst>
                                           <p:attrName>style.visibility</p:attrName>
@@ -11863,600 +12111,6 @@
                                     <p:set>
                                       <p:cBhvr>
                                         <p:cTn id="54" dur="1" fill="hold">
-                                          <p:stCondLst>
-                                            <p:cond delay="0"/>
-                                          </p:stCondLst>
-                                        </p:cTn>
-                                        <p:tgtEl>
-                                          <p:spTgt spid="31"/>
-                                        </p:tgtEl>
-                                        <p:attrNameLst>
-                                          <p:attrName>style.visibility</p:attrName>
-                                        </p:attrNameLst>
-                                      </p:cBhvr>
-                                      <p:to>
-                                        <p:strVal val="visible"/>
-                                      </p:to>
-                                    </p:set>
-                                  </p:childTnLst>
-                                </p:cTn>
-                              </p:par>
-                              <p:par>
-                                <p:cTn id="55" presetID="1" presetClass="entr" presetSubtype="0" fill="hold" nodeType="withEffect">
-                                  <p:stCondLst>
-                                    <p:cond delay="0"/>
-                                  </p:stCondLst>
-                                  <p:childTnLst>
-                                    <p:set>
-                                      <p:cBhvr>
-                                        <p:cTn id="56" dur="1" fill="hold">
-                                          <p:stCondLst>
-                                            <p:cond delay="0"/>
-                                          </p:stCondLst>
-                                        </p:cTn>
-                                        <p:tgtEl>
-                                          <p:spTgt spid="64"/>
-                                        </p:tgtEl>
-                                        <p:attrNameLst>
-                                          <p:attrName>style.visibility</p:attrName>
-                                        </p:attrNameLst>
-                                      </p:cBhvr>
-                                      <p:to>
-                                        <p:strVal val="visible"/>
-                                      </p:to>
-                                    </p:set>
-                                  </p:childTnLst>
-                                </p:cTn>
-                              </p:par>
-                              <p:par>
-                                <p:cTn id="57" presetID="1" presetClass="entr" presetSubtype="0" fill="hold" nodeType="withEffect">
-                                  <p:stCondLst>
-                                    <p:cond delay="0"/>
-                                  </p:stCondLst>
-                                  <p:childTnLst>
-                                    <p:set>
-                                      <p:cBhvr>
-                                        <p:cTn id="58" dur="1" fill="hold">
-                                          <p:stCondLst>
-                                            <p:cond delay="0"/>
-                                          </p:stCondLst>
-                                        </p:cTn>
-                                        <p:tgtEl>
-                                          <p:spTgt spid="30"/>
-                                        </p:tgtEl>
-                                        <p:attrNameLst>
-                                          <p:attrName>style.visibility</p:attrName>
-                                        </p:attrNameLst>
-                                      </p:cBhvr>
-                                      <p:to>
-                                        <p:strVal val="visible"/>
-                                      </p:to>
-                                    </p:set>
-                                  </p:childTnLst>
-                                </p:cTn>
-                              </p:par>
-                              <p:par>
-                                <p:cTn id="59" presetID="1" presetClass="entr" presetSubtype="0" fill="hold" nodeType="withEffect">
-                                  <p:stCondLst>
-                                    <p:cond delay="0"/>
-                                  </p:stCondLst>
-                                  <p:childTnLst>
-                                    <p:set>
-                                      <p:cBhvr>
-                                        <p:cTn id="60" dur="1" fill="hold">
-                                          <p:stCondLst>
-                                            <p:cond delay="0"/>
-                                          </p:stCondLst>
-                                        </p:cTn>
-                                        <p:tgtEl>
-                                          <p:spTgt spid="65"/>
-                                        </p:tgtEl>
-                                        <p:attrNameLst>
-                                          <p:attrName>style.visibility</p:attrName>
-                                        </p:attrNameLst>
-                                      </p:cBhvr>
-                                      <p:to>
-                                        <p:strVal val="visible"/>
-                                      </p:to>
-                                    </p:set>
-                                  </p:childTnLst>
-                                </p:cTn>
-                              </p:par>
-                              <p:par>
-                                <p:cTn id="61" presetID="1" presetClass="entr" presetSubtype="0" fill="hold" nodeType="withEffect">
-                                  <p:stCondLst>
-                                    <p:cond delay="0"/>
-                                  </p:stCondLst>
-                                  <p:childTnLst>
-                                    <p:set>
-                                      <p:cBhvr>
-                                        <p:cTn id="62" dur="1" fill="hold">
-                                          <p:stCondLst>
-                                            <p:cond delay="0"/>
-                                          </p:stCondLst>
-                                        </p:cTn>
-                                        <p:tgtEl>
-                                          <p:spTgt spid="29"/>
-                                        </p:tgtEl>
-                                        <p:attrNameLst>
-                                          <p:attrName>style.visibility</p:attrName>
-                                        </p:attrNameLst>
-                                      </p:cBhvr>
-                                      <p:to>
-                                        <p:strVal val="visible"/>
-                                      </p:to>
-                                    </p:set>
-                                  </p:childTnLst>
-                                </p:cTn>
-                              </p:par>
-                              <p:par>
-                                <p:cTn id="63" presetID="1" presetClass="entr" presetSubtype="0" fill="hold" nodeType="withEffect">
-                                  <p:stCondLst>
-                                    <p:cond delay="0"/>
-                                  </p:stCondLst>
-                                  <p:childTnLst>
-                                    <p:set>
-                                      <p:cBhvr>
-                                        <p:cTn id="64" dur="1" fill="hold">
-                                          <p:stCondLst>
-                                            <p:cond delay="0"/>
-                                          </p:stCondLst>
-                                        </p:cTn>
-                                        <p:tgtEl>
-                                          <p:spTgt spid="20"/>
-                                        </p:tgtEl>
-                                        <p:attrNameLst>
-                                          <p:attrName>style.visibility</p:attrName>
-                                        </p:attrNameLst>
-                                      </p:cBhvr>
-                                      <p:to>
-                                        <p:strVal val="visible"/>
-                                      </p:to>
-                                    </p:set>
-                                  </p:childTnLst>
-                                </p:cTn>
-                              </p:par>
-                              <p:par>
-                                <p:cTn id="65" presetID="1" presetClass="entr" presetSubtype="0" fill="hold" nodeType="withEffect">
-                                  <p:stCondLst>
-                                    <p:cond delay="0"/>
-                                  </p:stCondLst>
-                                  <p:childTnLst>
-                                    <p:set>
-                                      <p:cBhvr>
-                                        <p:cTn id="66" dur="1" fill="hold">
-                                          <p:stCondLst>
-                                            <p:cond delay="0"/>
-                                          </p:stCondLst>
-                                        </p:cTn>
-                                        <p:tgtEl>
-                                          <p:spTgt spid="19"/>
-                                        </p:tgtEl>
-                                        <p:attrNameLst>
-                                          <p:attrName>style.visibility</p:attrName>
-                                        </p:attrNameLst>
-                                      </p:cBhvr>
-                                      <p:to>
-                                        <p:strVal val="visible"/>
-                                      </p:to>
-                                    </p:set>
-                                  </p:childTnLst>
-                                </p:cTn>
-                              </p:par>
-                              <p:par>
-                                <p:cTn id="67" presetID="1" presetClass="entr" presetSubtype="0" fill="hold" nodeType="withEffect">
-                                  <p:stCondLst>
-                                    <p:cond delay="0"/>
-                                  </p:stCondLst>
-                                  <p:childTnLst>
-                                    <p:set>
-                                      <p:cBhvr>
-                                        <p:cTn id="68" dur="1" fill="hold">
-                                          <p:stCondLst>
-                                            <p:cond delay="0"/>
-                                          </p:stCondLst>
-                                        </p:cTn>
-                                        <p:tgtEl>
-                                          <p:spTgt spid="18"/>
-                                        </p:tgtEl>
-                                        <p:attrNameLst>
-                                          <p:attrName>style.visibility</p:attrName>
-                                        </p:attrNameLst>
-                                      </p:cBhvr>
-                                      <p:to>
-                                        <p:strVal val="visible"/>
-                                      </p:to>
-                                    </p:set>
-                                  </p:childTnLst>
-                                </p:cTn>
-                              </p:par>
-                              <p:par>
-                                <p:cTn id="69" presetID="1" presetClass="entr" presetSubtype="0" fill="hold" nodeType="withEffect">
-                                  <p:stCondLst>
-                                    <p:cond delay="0"/>
-                                  </p:stCondLst>
-                                  <p:childTnLst>
-                                    <p:set>
-                                      <p:cBhvr>
-                                        <p:cTn id="70" dur="1" fill="hold">
-                                          <p:stCondLst>
-                                            <p:cond delay="0"/>
-                                          </p:stCondLst>
-                                        </p:cTn>
-                                        <p:tgtEl>
-                                          <p:spTgt spid="12"/>
-                                        </p:tgtEl>
-                                        <p:attrNameLst>
-                                          <p:attrName>style.visibility</p:attrName>
-                                        </p:attrNameLst>
-                                      </p:cBhvr>
-                                      <p:to>
-                                        <p:strVal val="visible"/>
-                                      </p:to>
-                                    </p:set>
-                                  </p:childTnLst>
-                                </p:cTn>
-                              </p:par>
-                              <p:par>
-                                <p:cTn id="71" presetID="1" presetClass="entr" presetSubtype="0" fill="hold" nodeType="withEffect">
-                                  <p:stCondLst>
-                                    <p:cond delay="0"/>
-                                  </p:stCondLst>
-                                  <p:childTnLst>
-                                    <p:set>
-                                      <p:cBhvr>
-                                        <p:cTn id="72" dur="1" fill="hold">
-                                          <p:stCondLst>
-                                            <p:cond delay="0"/>
-                                          </p:stCondLst>
-                                        </p:cTn>
-                                        <p:tgtEl>
-                                          <p:spTgt spid="16"/>
-                                        </p:tgtEl>
-                                        <p:attrNameLst>
-                                          <p:attrName>style.visibility</p:attrName>
-                                        </p:attrNameLst>
-                                      </p:cBhvr>
-                                      <p:to>
-                                        <p:strVal val="visible"/>
-                                      </p:to>
-                                    </p:set>
-                                  </p:childTnLst>
-                                </p:cTn>
-                              </p:par>
-                              <p:par>
-                                <p:cTn id="73" presetID="1" presetClass="entr" presetSubtype="0" fill="hold" nodeType="withEffect">
-                                  <p:stCondLst>
-                                    <p:cond delay="0"/>
-                                  </p:stCondLst>
-                                  <p:childTnLst>
-                                    <p:set>
-                                      <p:cBhvr>
-                                        <p:cTn id="74" dur="1" fill="hold">
-                                          <p:stCondLst>
-                                            <p:cond delay="0"/>
-                                          </p:stCondLst>
-                                        </p:cTn>
-                                        <p:tgtEl>
-                                          <p:spTgt spid="14"/>
-                                        </p:tgtEl>
-                                        <p:attrNameLst>
-                                          <p:attrName>style.visibility</p:attrName>
-                                        </p:attrNameLst>
-                                      </p:cBhvr>
-                                      <p:to>
-                                        <p:strVal val="visible"/>
-                                      </p:to>
-                                    </p:set>
-                                  </p:childTnLst>
-                                </p:cTn>
-                              </p:par>
-                              <p:par>
-                                <p:cTn id="75" presetID="1" presetClass="entr" presetSubtype="0" fill="hold" nodeType="withEffect">
-                                  <p:stCondLst>
-                                    <p:cond delay="0"/>
-                                  </p:stCondLst>
-                                  <p:childTnLst>
-                                    <p:set>
-                                      <p:cBhvr>
-                                        <p:cTn id="76" dur="1" fill="hold">
-                                          <p:stCondLst>
-                                            <p:cond delay="0"/>
-                                          </p:stCondLst>
-                                        </p:cTn>
-                                        <p:tgtEl>
-                                          <p:spTgt spid="6"/>
-                                        </p:tgtEl>
-                                        <p:attrNameLst>
-                                          <p:attrName>style.visibility</p:attrName>
-                                        </p:attrNameLst>
-                                      </p:cBhvr>
-                                      <p:to>
-                                        <p:strVal val="visible"/>
-                                      </p:to>
-                                    </p:set>
-                                  </p:childTnLst>
-                                </p:cTn>
-                              </p:par>
-                              <p:par>
-                                <p:cTn id="77" presetID="1" presetClass="entr" presetSubtype="0" fill="hold" nodeType="withEffect">
-                                  <p:stCondLst>
-                                    <p:cond delay="0"/>
-                                  </p:stCondLst>
-                                  <p:childTnLst>
-                                    <p:set>
-                                      <p:cBhvr>
-                                        <p:cTn id="78" dur="1" fill="hold">
-                                          <p:stCondLst>
-                                            <p:cond delay="0"/>
-                                          </p:stCondLst>
-                                        </p:cTn>
-                                        <p:tgtEl>
-                                          <p:spTgt spid="13"/>
-                                        </p:tgtEl>
-                                        <p:attrNameLst>
-                                          <p:attrName>style.visibility</p:attrName>
-                                        </p:attrNameLst>
-                                      </p:cBhvr>
-                                      <p:to>
-                                        <p:strVal val="visible"/>
-                                      </p:to>
-                                    </p:set>
-                                  </p:childTnLst>
-                                </p:cTn>
-                              </p:par>
-                              <p:par>
-                                <p:cTn id="79" presetID="1" presetClass="entr" presetSubtype="0" fill="hold" nodeType="withEffect">
-                                  <p:stCondLst>
-                                    <p:cond delay="0"/>
-                                  </p:stCondLst>
-                                  <p:childTnLst>
-                                    <p:set>
-                                      <p:cBhvr>
-                                        <p:cTn id="80" dur="1" fill="hold">
-                                          <p:stCondLst>
-                                            <p:cond delay="0"/>
-                                          </p:stCondLst>
-                                        </p:cTn>
-                                        <p:tgtEl>
-                                          <p:spTgt spid="23"/>
-                                        </p:tgtEl>
-                                        <p:attrNameLst>
-                                          <p:attrName>style.visibility</p:attrName>
-                                        </p:attrNameLst>
-                                      </p:cBhvr>
-                                      <p:to>
-                                        <p:strVal val="visible"/>
-                                      </p:to>
-                                    </p:set>
-                                  </p:childTnLst>
-                                </p:cTn>
-                              </p:par>
-                              <p:par>
-                                <p:cTn id="81" presetID="1" presetClass="entr" presetSubtype="0" fill="hold" nodeType="withEffect">
-                                  <p:stCondLst>
-                                    <p:cond delay="0"/>
-                                  </p:stCondLst>
-                                  <p:childTnLst>
-                                    <p:set>
-                                      <p:cBhvr>
-                                        <p:cTn id="82" dur="1" fill="hold">
-                                          <p:stCondLst>
-                                            <p:cond delay="0"/>
-                                          </p:stCondLst>
-                                        </p:cTn>
-                                        <p:tgtEl>
-                                          <p:spTgt spid="28"/>
-                                        </p:tgtEl>
-                                        <p:attrNameLst>
-                                          <p:attrName>style.visibility</p:attrName>
-                                        </p:attrNameLst>
-                                      </p:cBhvr>
-                                      <p:to>
-                                        <p:strVal val="visible"/>
-                                      </p:to>
-                                    </p:set>
-                                  </p:childTnLst>
-                                </p:cTn>
-                              </p:par>
-                              <p:par>
-                                <p:cTn id="83" presetID="1" presetClass="entr" presetSubtype="0" fill="hold" nodeType="withEffect">
-                                  <p:stCondLst>
-                                    <p:cond delay="0"/>
-                                  </p:stCondLst>
-                                  <p:childTnLst>
-                                    <p:set>
-                                      <p:cBhvr>
-                                        <p:cTn id="84" dur="1" fill="hold">
-                                          <p:stCondLst>
-                                            <p:cond delay="0"/>
-                                          </p:stCondLst>
-                                        </p:cTn>
-                                        <p:tgtEl>
-                                          <p:spTgt spid="27"/>
-                                        </p:tgtEl>
-                                        <p:attrNameLst>
-                                          <p:attrName>style.visibility</p:attrName>
-                                        </p:attrNameLst>
-                                      </p:cBhvr>
-                                      <p:to>
-                                        <p:strVal val="visible"/>
-                                      </p:to>
-                                    </p:set>
-                                  </p:childTnLst>
-                                </p:cTn>
-                              </p:par>
-                              <p:par>
-                                <p:cTn id="85" presetID="1" presetClass="entr" presetSubtype="0" fill="hold" nodeType="withEffect">
-                                  <p:stCondLst>
-                                    <p:cond delay="0"/>
-                                  </p:stCondLst>
-                                  <p:childTnLst>
-                                    <p:set>
-                                      <p:cBhvr>
-                                        <p:cTn id="86" dur="1" fill="hold">
-                                          <p:stCondLst>
-                                            <p:cond delay="0"/>
-                                          </p:stCondLst>
-                                        </p:cTn>
-                                        <p:tgtEl>
-                                          <p:spTgt spid="25"/>
-                                        </p:tgtEl>
-                                        <p:attrNameLst>
-                                          <p:attrName>style.visibility</p:attrName>
-                                        </p:attrNameLst>
-                                      </p:cBhvr>
-                                      <p:to>
-                                        <p:strVal val="visible"/>
-                                      </p:to>
-                                    </p:set>
-                                  </p:childTnLst>
-                                </p:cTn>
-                              </p:par>
-                              <p:par>
-                                <p:cTn id="87" presetID="1" presetClass="entr" presetSubtype="0" fill="hold" nodeType="withEffect">
-                                  <p:stCondLst>
-                                    <p:cond delay="0"/>
-                                  </p:stCondLst>
-                                  <p:childTnLst>
-                                    <p:set>
-                                      <p:cBhvr>
-                                        <p:cTn id="88" dur="1" fill="hold">
-                                          <p:stCondLst>
-                                            <p:cond delay="0"/>
-                                          </p:stCondLst>
-                                        </p:cTn>
-                                        <p:tgtEl>
-                                          <p:spTgt spid="26"/>
-                                        </p:tgtEl>
-                                        <p:attrNameLst>
-                                          <p:attrName>style.visibility</p:attrName>
-                                        </p:attrNameLst>
-                                      </p:cBhvr>
-                                      <p:to>
-                                        <p:strVal val="visible"/>
-                                      </p:to>
-                                    </p:set>
-                                  </p:childTnLst>
-                                </p:cTn>
-                              </p:par>
-                              <p:par>
-                                <p:cTn id="89" presetID="1" presetClass="entr" presetSubtype="0" fill="hold" nodeType="withEffect">
-                                  <p:stCondLst>
-                                    <p:cond delay="0"/>
-                                  </p:stCondLst>
-                                  <p:childTnLst>
-                                    <p:set>
-                                      <p:cBhvr>
-                                        <p:cTn id="90" dur="1" fill="hold">
-                                          <p:stCondLst>
-                                            <p:cond delay="0"/>
-                                          </p:stCondLst>
-                                        </p:cTn>
-                                        <p:tgtEl>
-                                          <p:spTgt spid="22"/>
-                                        </p:tgtEl>
-                                        <p:attrNameLst>
-                                          <p:attrName>style.visibility</p:attrName>
-                                        </p:attrNameLst>
-                                      </p:cBhvr>
-                                      <p:to>
-                                        <p:strVal val="visible"/>
-                                      </p:to>
-                                    </p:set>
-                                  </p:childTnLst>
-                                </p:cTn>
-                              </p:par>
-                              <p:par>
-                                <p:cTn id="91" presetID="1" presetClass="entr" presetSubtype="0" fill="hold" nodeType="withEffect">
-                                  <p:stCondLst>
-                                    <p:cond delay="0"/>
-                                  </p:stCondLst>
-                                  <p:childTnLst>
-                                    <p:set>
-                                      <p:cBhvr>
-                                        <p:cTn id="92" dur="1" fill="hold">
-                                          <p:stCondLst>
-                                            <p:cond delay="0"/>
-                                          </p:stCondLst>
-                                        </p:cTn>
-                                        <p:tgtEl>
-                                          <p:spTgt spid="24"/>
-                                        </p:tgtEl>
-                                        <p:attrNameLst>
-                                          <p:attrName>style.visibility</p:attrName>
-                                        </p:attrNameLst>
-                                      </p:cBhvr>
-                                      <p:to>
-                                        <p:strVal val="visible"/>
-                                      </p:to>
-                                    </p:set>
-                                  </p:childTnLst>
-                                </p:cTn>
-                              </p:par>
-                              <p:par>
-                                <p:cTn id="93" presetID="1" presetClass="entr" presetSubtype="0" fill="hold" nodeType="withEffect">
-                                  <p:stCondLst>
-                                    <p:cond delay="0"/>
-                                  </p:stCondLst>
-                                  <p:childTnLst>
-                                    <p:set>
-                                      <p:cBhvr>
-                                        <p:cTn id="94" dur="1" fill="hold">
-                                          <p:stCondLst>
-                                            <p:cond delay="0"/>
-                                          </p:stCondLst>
-                                        </p:cTn>
-                                        <p:tgtEl>
-                                          <p:spTgt spid="104"/>
-                                        </p:tgtEl>
-                                        <p:attrNameLst>
-                                          <p:attrName>style.visibility</p:attrName>
-                                        </p:attrNameLst>
-                                      </p:cBhvr>
-                                      <p:to>
-                                        <p:strVal val="visible"/>
-                                      </p:to>
-                                    </p:set>
-                                  </p:childTnLst>
-                                </p:cTn>
-                              </p:par>
-                              <p:par>
-                                <p:cTn id="95" presetID="1" presetClass="entr" presetSubtype="0" fill="hold" nodeType="withEffect">
-                                  <p:stCondLst>
-                                    <p:cond delay="0"/>
-                                  </p:stCondLst>
-                                  <p:childTnLst>
-                                    <p:set>
-                                      <p:cBhvr>
-                                        <p:cTn id="96" dur="1" fill="hold">
-                                          <p:stCondLst>
-                                            <p:cond delay="0"/>
-                                          </p:stCondLst>
-                                        </p:cTn>
-                                        <p:tgtEl>
-                                          <p:spTgt spid="103"/>
-                                        </p:tgtEl>
-                                        <p:attrNameLst>
-                                          <p:attrName>style.visibility</p:attrName>
-                                        </p:attrNameLst>
-                                      </p:cBhvr>
-                                      <p:to>
-                                        <p:strVal val="visible"/>
-                                      </p:to>
-                                    </p:set>
-                                  </p:childTnLst>
-                                </p:cTn>
-                              </p:par>
-                              <p:par>
-                                <p:cTn id="97" presetID="1" presetClass="entr" presetSubtype="0" fill="hold" nodeType="withEffect">
-                                  <p:stCondLst>
-                                    <p:cond delay="0"/>
-                                  </p:stCondLst>
-                                  <p:childTnLst>
-                                    <p:set>
-                                      <p:cBhvr>
-                                        <p:cTn id="98" dur="1" fill="hold">
                                           <p:stCondLst>
                                             <p:cond delay="0"/>
                                           </p:stCondLst>
@@ -12486,19 +12140,604 @@
                     </p:cTn>
                   </p:par>
                   <p:par>
-                    <p:cTn id="99" fill="hold">
+                    <p:cTn id="55" fill="hold">
                       <p:stCondLst>
                         <p:cond delay="indefinite"/>
                       </p:stCondLst>
                       <p:childTnLst>
                         <p:par>
-                          <p:cTn id="100" fill="hold">
+                          <p:cTn id="56" fill="hold">
                             <p:stCondLst>
                               <p:cond delay="0"/>
                             </p:stCondLst>
                             <p:childTnLst>
                               <p:par>
-                                <p:cTn id="101" presetID="1" presetClass="entr" presetSubtype="0" fill="hold" nodeType="clickEffect">
+                                <p:cTn id="57" presetID="1" presetClass="entr" presetSubtype="0" fill="hold" nodeType="clickEffect">
+                                  <p:stCondLst>
+                                    <p:cond delay="0"/>
+                                  </p:stCondLst>
+                                  <p:childTnLst>
+                                    <p:set>
+                                      <p:cBhvr>
+                                        <p:cTn id="58" dur="1" fill="hold">
+                                          <p:stCondLst>
+                                            <p:cond delay="0"/>
+                                          </p:stCondLst>
+                                        </p:cTn>
+                                        <p:tgtEl>
+                                          <p:spTgt spid="102"/>
+                                        </p:tgtEl>
+                                        <p:attrNameLst>
+                                          <p:attrName>style.visibility</p:attrName>
+                                        </p:attrNameLst>
+                                      </p:cBhvr>
+                                      <p:to>
+                                        <p:strVal val="visible"/>
+                                      </p:to>
+                                    </p:set>
+                                  </p:childTnLst>
+                                </p:cTn>
+                              </p:par>
+                              <p:par>
+                                <p:cTn id="59" presetID="1" presetClass="entr" presetSubtype="0" fill="hold" nodeType="withEffect">
+                                  <p:stCondLst>
+                                    <p:cond delay="0"/>
+                                  </p:stCondLst>
+                                  <p:childTnLst>
+                                    <p:set>
+                                      <p:cBhvr>
+                                        <p:cTn id="60" dur="1" fill="hold">
+                                          <p:stCondLst>
+                                            <p:cond delay="0"/>
+                                          </p:stCondLst>
+                                        </p:cTn>
+                                        <p:tgtEl>
+                                          <p:spTgt spid="101"/>
+                                        </p:tgtEl>
+                                        <p:attrNameLst>
+                                          <p:attrName>style.visibility</p:attrName>
+                                        </p:attrNameLst>
+                                      </p:cBhvr>
+                                      <p:to>
+                                        <p:strVal val="visible"/>
+                                      </p:to>
+                                    </p:set>
+                                  </p:childTnLst>
+                                </p:cTn>
+                              </p:par>
+                              <p:par>
+                                <p:cTn id="61" presetID="1" presetClass="entr" presetSubtype="0" fill="hold" nodeType="withEffect">
+                                  <p:stCondLst>
+                                    <p:cond delay="0"/>
+                                  </p:stCondLst>
+                                  <p:childTnLst>
+                                    <p:set>
+                                      <p:cBhvr>
+                                        <p:cTn id="62" dur="1" fill="hold">
+                                          <p:stCondLst>
+                                            <p:cond delay="0"/>
+                                          </p:stCondLst>
+                                        </p:cTn>
+                                        <p:tgtEl>
+                                          <p:spTgt spid="100"/>
+                                        </p:tgtEl>
+                                        <p:attrNameLst>
+                                          <p:attrName>style.visibility</p:attrName>
+                                        </p:attrNameLst>
+                                      </p:cBhvr>
+                                      <p:to>
+                                        <p:strVal val="visible"/>
+                                      </p:to>
+                                    </p:set>
+                                  </p:childTnLst>
+                                </p:cTn>
+                              </p:par>
+                              <p:par>
+                                <p:cTn id="63" presetID="1" presetClass="entr" presetSubtype="0" fill="hold" nodeType="withEffect">
+                                  <p:stCondLst>
+                                    <p:cond delay="0"/>
+                                  </p:stCondLst>
+                                  <p:childTnLst>
+                                    <p:set>
+                                      <p:cBhvr>
+                                        <p:cTn id="64" dur="1" fill="hold">
+                                          <p:stCondLst>
+                                            <p:cond delay="0"/>
+                                          </p:stCondLst>
+                                        </p:cTn>
+                                        <p:tgtEl>
+                                          <p:spTgt spid="99"/>
+                                        </p:tgtEl>
+                                        <p:attrNameLst>
+                                          <p:attrName>style.visibility</p:attrName>
+                                        </p:attrNameLst>
+                                      </p:cBhvr>
+                                      <p:to>
+                                        <p:strVal val="visible"/>
+                                      </p:to>
+                                    </p:set>
+                                  </p:childTnLst>
+                                </p:cTn>
+                              </p:par>
+                              <p:par>
+                                <p:cTn id="65" presetID="1" presetClass="entr" presetSubtype="0" fill="hold" nodeType="withEffect">
+                                  <p:stCondLst>
+                                    <p:cond delay="0"/>
+                                  </p:stCondLst>
+                                  <p:childTnLst>
+                                    <p:set>
+                                      <p:cBhvr>
+                                        <p:cTn id="66" dur="1" fill="hold">
+                                          <p:stCondLst>
+                                            <p:cond delay="0"/>
+                                          </p:stCondLst>
+                                        </p:cTn>
+                                        <p:tgtEl>
+                                          <p:spTgt spid="98"/>
+                                        </p:tgtEl>
+                                        <p:attrNameLst>
+                                          <p:attrName>style.visibility</p:attrName>
+                                        </p:attrNameLst>
+                                      </p:cBhvr>
+                                      <p:to>
+                                        <p:strVal val="visible"/>
+                                      </p:to>
+                                    </p:set>
+                                  </p:childTnLst>
+                                </p:cTn>
+                              </p:par>
+                              <p:par>
+                                <p:cTn id="67" presetID="1" presetClass="entr" presetSubtype="0" fill="hold" nodeType="withEffect">
+                                  <p:stCondLst>
+                                    <p:cond delay="0"/>
+                                  </p:stCondLst>
+                                  <p:childTnLst>
+                                    <p:set>
+                                      <p:cBhvr>
+                                        <p:cTn id="68" dur="1" fill="hold">
+                                          <p:stCondLst>
+                                            <p:cond delay="0"/>
+                                          </p:stCondLst>
+                                        </p:cTn>
+                                        <p:tgtEl>
+                                          <p:spTgt spid="86"/>
+                                        </p:tgtEl>
+                                        <p:attrNameLst>
+                                          <p:attrName>style.visibility</p:attrName>
+                                        </p:attrNameLst>
+                                      </p:cBhvr>
+                                      <p:to>
+                                        <p:strVal val="visible"/>
+                                      </p:to>
+                                    </p:set>
+                                  </p:childTnLst>
+                                </p:cTn>
+                              </p:par>
+                              <p:par>
+                                <p:cTn id="69" presetID="1" presetClass="entr" presetSubtype="0" fill="hold" nodeType="withEffect">
+                                  <p:stCondLst>
+                                    <p:cond delay="0"/>
+                                  </p:stCondLst>
+                                  <p:childTnLst>
+                                    <p:set>
+                                      <p:cBhvr>
+                                        <p:cTn id="70" dur="1" fill="hold">
+                                          <p:stCondLst>
+                                            <p:cond delay="0"/>
+                                          </p:stCondLst>
+                                        </p:cTn>
+                                        <p:tgtEl>
+                                          <p:spTgt spid="75"/>
+                                        </p:tgtEl>
+                                        <p:attrNameLst>
+                                          <p:attrName>style.visibility</p:attrName>
+                                        </p:attrNameLst>
+                                      </p:cBhvr>
+                                      <p:to>
+                                        <p:strVal val="visible"/>
+                                      </p:to>
+                                    </p:set>
+                                  </p:childTnLst>
+                                </p:cTn>
+                              </p:par>
+                              <p:par>
+                                <p:cTn id="71" presetID="1" presetClass="entr" presetSubtype="0" fill="hold" nodeType="withEffect">
+                                  <p:stCondLst>
+                                    <p:cond delay="0"/>
+                                  </p:stCondLst>
+                                  <p:childTnLst>
+                                    <p:set>
+                                      <p:cBhvr>
+                                        <p:cTn id="72" dur="1" fill="hold">
+                                          <p:stCondLst>
+                                            <p:cond delay="0"/>
+                                          </p:stCondLst>
+                                        </p:cTn>
+                                        <p:tgtEl>
+                                          <p:spTgt spid="97"/>
+                                        </p:tgtEl>
+                                        <p:attrNameLst>
+                                          <p:attrName>style.visibility</p:attrName>
+                                        </p:attrNameLst>
+                                      </p:cBhvr>
+                                      <p:to>
+                                        <p:strVal val="visible"/>
+                                      </p:to>
+                                    </p:set>
+                                  </p:childTnLst>
+                                </p:cTn>
+                              </p:par>
+                              <p:par>
+                                <p:cTn id="73" presetID="1" presetClass="entr" presetSubtype="0" fill="hold" nodeType="withEffect">
+                                  <p:stCondLst>
+                                    <p:cond delay="0"/>
+                                  </p:stCondLst>
+                                  <p:childTnLst>
+                                    <p:set>
+                                      <p:cBhvr>
+                                        <p:cTn id="74" dur="1" fill="hold">
+                                          <p:stCondLst>
+                                            <p:cond delay="0"/>
+                                          </p:stCondLst>
+                                        </p:cTn>
+                                        <p:tgtEl>
+                                          <p:spTgt spid="87"/>
+                                        </p:tgtEl>
+                                        <p:attrNameLst>
+                                          <p:attrName>style.visibility</p:attrName>
+                                        </p:attrNameLst>
+                                      </p:cBhvr>
+                                      <p:to>
+                                        <p:strVal val="visible"/>
+                                      </p:to>
+                                    </p:set>
+                                  </p:childTnLst>
+                                </p:cTn>
+                              </p:par>
+                              <p:par>
+                                <p:cTn id="75" presetID="1" presetClass="entr" presetSubtype="0" fill="hold" nodeType="withEffect">
+                                  <p:stCondLst>
+                                    <p:cond delay="0"/>
+                                  </p:stCondLst>
+                                  <p:childTnLst>
+                                    <p:set>
+                                      <p:cBhvr>
+                                        <p:cTn id="76" dur="1" fill="hold">
+                                          <p:stCondLst>
+                                            <p:cond delay="0"/>
+                                          </p:stCondLst>
+                                        </p:cTn>
+                                        <p:tgtEl>
+                                          <p:spTgt spid="96"/>
+                                        </p:tgtEl>
+                                        <p:attrNameLst>
+                                          <p:attrName>style.visibility</p:attrName>
+                                        </p:attrNameLst>
+                                      </p:cBhvr>
+                                      <p:to>
+                                        <p:strVal val="visible"/>
+                                      </p:to>
+                                    </p:set>
+                                  </p:childTnLst>
+                                </p:cTn>
+                              </p:par>
+                              <p:par>
+                                <p:cTn id="77" presetID="1" presetClass="entr" presetSubtype="0" fill="hold" nodeType="withEffect">
+                                  <p:stCondLst>
+                                    <p:cond delay="0"/>
+                                  </p:stCondLst>
+                                  <p:childTnLst>
+                                    <p:set>
+                                      <p:cBhvr>
+                                        <p:cTn id="78" dur="1" fill="hold">
+                                          <p:stCondLst>
+                                            <p:cond delay="0"/>
+                                          </p:stCondLst>
+                                        </p:cTn>
+                                        <p:tgtEl>
+                                          <p:spTgt spid="88"/>
+                                        </p:tgtEl>
+                                        <p:attrNameLst>
+                                          <p:attrName>style.visibility</p:attrName>
+                                        </p:attrNameLst>
+                                      </p:cBhvr>
+                                      <p:to>
+                                        <p:strVal val="visible"/>
+                                      </p:to>
+                                    </p:set>
+                                  </p:childTnLst>
+                                </p:cTn>
+                              </p:par>
+                              <p:par>
+                                <p:cTn id="79" presetID="1" presetClass="entr" presetSubtype="0" fill="hold" nodeType="withEffect">
+                                  <p:stCondLst>
+                                    <p:cond delay="0"/>
+                                  </p:stCondLst>
+                                  <p:childTnLst>
+                                    <p:set>
+                                      <p:cBhvr>
+                                        <p:cTn id="80" dur="1" fill="hold">
+                                          <p:stCondLst>
+                                            <p:cond delay="0"/>
+                                          </p:stCondLst>
+                                        </p:cTn>
+                                        <p:tgtEl>
+                                          <p:spTgt spid="95"/>
+                                        </p:tgtEl>
+                                        <p:attrNameLst>
+                                          <p:attrName>style.visibility</p:attrName>
+                                        </p:attrNameLst>
+                                      </p:cBhvr>
+                                      <p:to>
+                                        <p:strVal val="visible"/>
+                                      </p:to>
+                                    </p:set>
+                                  </p:childTnLst>
+                                </p:cTn>
+                              </p:par>
+                              <p:par>
+                                <p:cTn id="81" presetID="1" presetClass="entr" presetSubtype="0" fill="hold" nodeType="withEffect">
+                                  <p:stCondLst>
+                                    <p:cond delay="0"/>
+                                  </p:stCondLst>
+                                  <p:childTnLst>
+                                    <p:set>
+                                      <p:cBhvr>
+                                        <p:cTn id="82" dur="1" fill="hold">
+                                          <p:stCondLst>
+                                            <p:cond delay="0"/>
+                                          </p:stCondLst>
+                                        </p:cTn>
+                                        <p:tgtEl>
+                                          <p:spTgt spid="90"/>
+                                        </p:tgtEl>
+                                        <p:attrNameLst>
+                                          <p:attrName>style.visibility</p:attrName>
+                                        </p:attrNameLst>
+                                      </p:cBhvr>
+                                      <p:to>
+                                        <p:strVal val="visible"/>
+                                      </p:to>
+                                    </p:set>
+                                  </p:childTnLst>
+                                </p:cTn>
+                              </p:par>
+                              <p:par>
+                                <p:cTn id="83" presetID="1" presetClass="entr" presetSubtype="0" fill="hold" nodeType="withEffect">
+                                  <p:stCondLst>
+                                    <p:cond delay="0"/>
+                                  </p:stCondLst>
+                                  <p:childTnLst>
+                                    <p:set>
+                                      <p:cBhvr>
+                                        <p:cTn id="84" dur="1" fill="hold">
+                                          <p:stCondLst>
+                                            <p:cond delay="0"/>
+                                          </p:stCondLst>
+                                        </p:cTn>
+                                        <p:tgtEl>
+                                          <p:spTgt spid="94"/>
+                                        </p:tgtEl>
+                                        <p:attrNameLst>
+                                          <p:attrName>style.visibility</p:attrName>
+                                        </p:attrNameLst>
+                                      </p:cBhvr>
+                                      <p:to>
+                                        <p:strVal val="visible"/>
+                                      </p:to>
+                                    </p:set>
+                                  </p:childTnLst>
+                                </p:cTn>
+                              </p:par>
+                              <p:par>
+                                <p:cTn id="85" presetID="1" presetClass="entr" presetSubtype="0" fill="hold" nodeType="withEffect">
+                                  <p:stCondLst>
+                                    <p:cond delay="0"/>
+                                  </p:stCondLst>
+                                  <p:childTnLst>
+                                    <p:set>
+                                      <p:cBhvr>
+                                        <p:cTn id="86" dur="1" fill="hold">
+                                          <p:stCondLst>
+                                            <p:cond delay="0"/>
+                                          </p:stCondLst>
+                                        </p:cTn>
+                                        <p:tgtEl>
+                                          <p:spTgt spid="89"/>
+                                        </p:tgtEl>
+                                        <p:attrNameLst>
+                                          <p:attrName>style.visibility</p:attrName>
+                                        </p:attrNameLst>
+                                      </p:cBhvr>
+                                      <p:to>
+                                        <p:strVal val="visible"/>
+                                      </p:to>
+                                    </p:set>
+                                  </p:childTnLst>
+                                </p:cTn>
+                              </p:par>
+                              <p:par>
+                                <p:cTn id="87" presetID="1" presetClass="entr" presetSubtype="0" fill="hold" nodeType="withEffect">
+                                  <p:stCondLst>
+                                    <p:cond delay="0"/>
+                                  </p:stCondLst>
+                                  <p:childTnLst>
+                                    <p:set>
+                                      <p:cBhvr>
+                                        <p:cTn id="88" dur="1" fill="hold">
+                                          <p:stCondLst>
+                                            <p:cond delay="0"/>
+                                          </p:stCondLst>
+                                        </p:cTn>
+                                        <p:tgtEl>
+                                          <p:spTgt spid="93"/>
+                                        </p:tgtEl>
+                                        <p:attrNameLst>
+                                          <p:attrName>style.visibility</p:attrName>
+                                        </p:attrNameLst>
+                                      </p:cBhvr>
+                                      <p:to>
+                                        <p:strVal val="visible"/>
+                                      </p:to>
+                                    </p:set>
+                                  </p:childTnLst>
+                                </p:cTn>
+                              </p:par>
+                              <p:par>
+                                <p:cTn id="89" presetID="1" presetClass="entr" presetSubtype="0" fill="hold" nodeType="withEffect">
+                                  <p:stCondLst>
+                                    <p:cond delay="0"/>
+                                  </p:stCondLst>
+                                  <p:childTnLst>
+                                    <p:set>
+                                      <p:cBhvr>
+                                        <p:cTn id="90" dur="1" fill="hold">
+                                          <p:stCondLst>
+                                            <p:cond delay="0"/>
+                                          </p:stCondLst>
+                                        </p:cTn>
+                                        <p:tgtEl>
+                                          <p:spTgt spid="92"/>
+                                        </p:tgtEl>
+                                        <p:attrNameLst>
+                                          <p:attrName>style.visibility</p:attrName>
+                                        </p:attrNameLst>
+                                      </p:cBhvr>
+                                      <p:to>
+                                        <p:strVal val="visible"/>
+                                      </p:to>
+                                    </p:set>
+                                  </p:childTnLst>
+                                </p:cTn>
+                              </p:par>
+                              <p:par>
+                                <p:cTn id="91" presetID="1" presetClass="entr" presetSubtype="0" fill="hold" nodeType="withEffect">
+                                  <p:stCondLst>
+                                    <p:cond delay="0"/>
+                                  </p:stCondLst>
+                                  <p:childTnLst>
+                                    <p:set>
+                                      <p:cBhvr>
+                                        <p:cTn id="92" dur="1" fill="hold">
+                                          <p:stCondLst>
+                                            <p:cond delay="0"/>
+                                          </p:stCondLst>
+                                        </p:cTn>
+                                        <p:tgtEl>
+                                          <p:spTgt spid="91"/>
+                                        </p:tgtEl>
+                                        <p:attrNameLst>
+                                          <p:attrName>style.visibility</p:attrName>
+                                        </p:attrNameLst>
+                                      </p:cBhvr>
+                                      <p:to>
+                                        <p:strVal val="visible"/>
+                                      </p:to>
+                                    </p:set>
+                                  </p:childTnLst>
+                                </p:cTn>
+                              </p:par>
+                              <p:par>
+                                <p:cTn id="93" presetID="1" presetClass="entr" presetSubtype="0" fill="hold" grpId="0" nodeType="withEffect">
+                                  <p:stCondLst>
+                                    <p:cond delay="0"/>
+                                  </p:stCondLst>
+                                  <p:childTnLst>
+                                    <p:set>
+                                      <p:cBhvr>
+                                        <p:cTn id="94" dur="1" fill="hold">
+                                          <p:stCondLst>
+                                            <p:cond delay="0"/>
+                                          </p:stCondLst>
+                                        </p:cTn>
+                                        <p:tgtEl>
+                                          <p:spTgt spid="194"/>
+                                        </p:tgtEl>
+                                        <p:attrNameLst>
+                                          <p:attrName>style.visibility</p:attrName>
+                                        </p:attrNameLst>
+                                      </p:cBhvr>
+                                      <p:to>
+                                        <p:strVal val="visible"/>
+                                      </p:to>
+                                    </p:set>
+                                  </p:childTnLst>
+                                </p:cTn>
+                              </p:par>
+                            </p:childTnLst>
+                          </p:cTn>
+                        </p:par>
+                      </p:childTnLst>
+                    </p:cTn>
+                  </p:par>
+                  <p:par>
+                    <p:cTn id="95" fill="hold">
+                      <p:stCondLst>
+                        <p:cond delay="indefinite"/>
+                      </p:stCondLst>
+                      <p:childTnLst>
+                        <p:par>
+                          <p:cTn id="96" fill="hold">
+                            <p:stCondLst>
+                              <p:cond delay="0"/>
+                            </p:stCondLst>
+                            <p:childTnLst>
+                              <p:par>
+                                <p:cTn id="97" presetID="1" presetClass="entr" presetSubtype="0" fill="hold" nodeType="clickEffect">
+                                  <p:stCondLst>
+                                    <p:cond delay="0"/>
+                                  </p:stCondLst>
+                                  <p:childTnLst>
+                                    <p:set>
+                                      <p:cBhvr>
+                                        <p:cTn id="98" dur="1" fill="hold">
+                                          <p:stCondLst>
+                                            <p:cond delay="0"/>
+                                          </p:stCondLst>
+                                        </p:cTn>
+                                        <p:tgtEl>
+                                          <p:spTgt spid="78"/>
+                                        </p:tgtEl>
+                                        <p:attrNameLst>
+                                          <p:attrName>style.visibility</p:attrName>
+                                        </p:attrNameLst>
+                                      </p:cBhvr>
+                                      <p:to>
+                                        <p:strVal val="visible"/>
+                                      </p:to>
+                                    </p:set>
+                                  </p:childTnLst>
+                                </p:cTn>
+                              </p:par>
+                              <p:par>
+                                <p:cTn id="99" presetID="1" presetClass="entr" presetSubtype="0" fill="hold" nodeType="withEffect">
+                                  <p:stCondLst>
+                                    <p:cond delay="0"/>
+                                  </p:stCondLst>
+                                  <p:childTnLst>
+                                    <p:set>
+                                      <p:cBhvr>
+                                        <p:cTn id="100" dur="1" fill="hold">
+                                          <p:stCondLst>
+                                            <p:cond delay="0"/>
+                                          </p:stCondLst>
+                                        </p:cTn>
+                                        <p:tgtEl>
+                                          <p:spTgt spid="7"/>
+                                        </p:tgtEl>
+                                        <p:attrNameLst>
+                                          <p:attrName>style.visibility</p:attrName>
+                                        </p:attrNameLst>
+                                      </p:cBhvr>
+                                      <p:to>
+                                        <p:strVal val="visible"/>
+                                      </p:to>
+                                    </p:set>
+                                  </p:childTnLst>
+                                </p:cTn>
+                              </p:par>
+                              <p:par>
+                                <p:cTn id="101" presetID="1" presetClass="entr" presetSubtype="0" fill="hold" nodeType="withEffect">
                                   <p:stCondLst>
                                     <p:cond delay="0"/>
                                   </p:stCondLst>
@@ -12511,7 +12750,7 @@
                                           </p:stCondLst>
                                         </p:cTn>
                                         <p:tgtEl>
-                                          <p:spTgt spid="102"/>
+                                          <p:spTgt spid="76"/>
                                         </p:tgtEl>
                                         <p:attrNameLst>
                                           <p:attrName>style.visibility</p:attrName>
@@ -12538,7 +12777,7 @@
                                           </p:stCondLst>
                                         </p:cTn>
                                         <p:tgtEl>
-                                          <p:spTgt spid="101"/>
+                                          <p:spTgt spid="77"/>
                                         </p:tgtEl>
                                         <p:attrNameLst>
                                           <p:attrName>style.visibility</p:attrName>
@@ -12565,7 +12804,7 @@
                                           </p:stCondLst>
                                         </p:cTn>
                                         <p:tgtEl>
-                                          <p:spTgt spid="100"/>
+                                          <p:spTgt spid="79"/>
                                         </p:tgtEl>
                                         <p:attrNameLst>
                                           <p:attrName>style.visibility</p:attrName>
@@ -12592,7 +12831,7 @@
                                           </p:stCondLst>
                                         </p:cTn>
                                         <p:tgtEl>
-                                          <p:spTgt spid="99"/>
+                                          <p:spTgt spid="74"/>
                                         </p:tgtEl>
                                         <p:attrNameLst>
                                           <p:attrName>style.visibility</p:attrName>
@@ -12619,7 +12858,7 @@
                                           </p:stCondLst>
                                         </p:cTn>
                                         <p:tgtEl>
-                                          <p:spTgt spid="98"/>
+                                          <p:spTgt spid="80"/>
                                         </p:tgtEl>
                                         <p:attrNameLst>
                                           <p:attrName>style.visibility</p:attrName>
@@ -12646,7 +12885,7 @@
                                           </p:stCondLst>
                                         </p:cTn>
                                         <p:tgtEl>
-                                          <p:spTgt spid="86"/>
+                                          <p:spTgt spid="73"/>
                                         </p:tgtEl>
                                         <p:attrNameLst>
                                           <p:attrName>style.visibility</p:attrName>
@@ -12673,7 +12912,7 @@
                                           </p:stCondLst>
                                         </p:cTn>
                                         <p:tgtEl>
-                                          <p:spTgt spid="75"/>
+                                          <p:spTgt spid="8"/>
                                         </p:tgtEl>
                                         <p:attrNameLst>
                                           <p:attrName>style.visibility</p:attrName>
@@ -12700,7 +12939,7 @@
                                           </p:stCondLst>
                                         </p:cTn>
                                         <p:tgtEl>
-                                          <p:spTgt spid="97"/>
+                                          <p:spTgt spid="81"/>
                                         </p:tgtEl>
                                         <p:attrNameLst>
                                           <p:attrName>style.visibility</p:attrName>
@@ -12727,7 +12966,7 @@
                                           </p:stCondLst>
                                         </p:cTn>
                                         <p:tgtEl>
-                                          <p:spTgt spid="87"/>
+                                          <p:spTgt spid="82"/>
                                         </p:tgtEl>
                                         <p:attrNameLst>
                                           <p:attrName>style.visibility</p:attrName>
@@ -12754,7 +12993,7 @@
                                           </p:stCondLst>
                                         </p:cTn>
                                         <p:tgtEl>
-                                          <p:spTgt spid="96"/>
+                                          <p:spTgt spid="3"/>
                                         </p:tgtEl>
                                         <p:attrNameLst>
                                           <p:attrName>style.visibility</p:attrName>
@@ -12781,7 +13020,7 @@
                                           </p:stCondLst>
                                         </p:cTn>
                                         <p:tgtEl>
-                                          <p:spTgt spid="88"/>
+                                          <p:spTgt spid="9"/>
                                         </p:tgtEl>
                                         <p:attrNameLst>
                                           <p:attrName>style.visibility</p:attrName>
@@ -12808,7 +13047,7 @@
                                           </p:stCondLst>
                                         </p:cTn>
                                         <p:tgtEl>
-                                          <p:spTgt spid="95"/>
+                                          <p:spTgt spid="17"/>
                                         </p:tgtEl>
                                         <p:attrNameLst>
                                           <p:attrName>style.visibility</p:attrName>
@@ -12835,7 +13074,7 @@
                                           </p:stCondLst>
                                         </p:cTn>
                                         <p:tgtEl>
-                                          <p:spTgt spid="90"/>
+                                          <p:spTgt spid="67"/>
                                         </p:tgtEl>
                                         <p:attrNameLst>
                                           <p:attrName>style.visibility</p:attrName>
@@ -12862,7 +13101,7 @@
                                           </p:stCondLst>
                                         </p:cTn>
                                         <p:tgtEl>
-                                          <p:spTgt spid="94"/>
+                                          <p:spTgt spid="68"/>
                                         </p:tgtEl>
                                         <p:attrNameLst>
                                           <p:attrName>style.visibility</p:attrName>
@@ -12889,7 +13128,7 @@
                                           </p:stCondLst>
                                         </p:cTn>
                                         <p:tgtEl>
-                                          <p:spTgt spid="89"/>
+                                          <p:spTgt spid="85"/>
                                         </p:tgtEl>
                                         <p:attrNameLst>
                                           <p:attrName>style.visibility</p:attrName>
@@ -12916,7 +13155,11 @@
                                           </p:stCondLst>
                                         </p:cTn>
                                         <p:tgtEl>
-                                          <p:spTgt spid="93"/>
+                                          <p:spTgt spid="21">
+                                            <p:txEl>
+                                              <p:pRg st="0" end="0"/>
+                                            </p:txEl>
+                                          </p:spTgt>
                                         </p:tgtEl>
                                         <p:attrNameLst>
                                           <p:attrName>style.visibility</p:attrName>
@@ -12943,7 +13186,7 @@
                                           </p:stCondLst>
                                         </p:cTn>
                                         <p:tgtEl>
-                                          <p:spTgt spid="92"/>
+                                          <p:spTgt spid="15"/>
                                         </p:tgtEl>
                                         <p:attrNameLst>
                                           <p:attrName>style.visibility</p:attrName>
@@ -12970,7 +13213,7 @@
                                           </p:stCondLst>
                                         </p:cTn>
                                         <p:tgtEl>
-                                          <p:spTgt spid="91"/>
+                                          <p:spTgt spid="11"/>
                                         </p:tgtEl>
                                         <p:attrNameLst>
                                           <p:attrName>style.visibility</p:attrName>
@@ -12984,7 +13227,7 @@
                                 </p:cTn>
                               </p:par>
                               <p:par>
-                                <p:cTn id="137" presetID="1" presetClass="entr" presetSubtype="0" fill="hold" grpId="0" nodeType="withEffect">
+                                <p:cTn id="137" presetID="1" presetClass="entr" presetSubtype="0" fill="hold" nodeType="withEffect">
                                   <p:stCondLst>
                                     <p:cond delay="0"/>
                                   </p:stCondLst>
@@ -12997,7 +13240,34 @@
                                           </p:stCondLst>
                                         </p:cTn>
                                         <p:tgtEl>
-                                          <p:spTgt spid="194"/>
+                                          <p:spTgt spid="70"/>
+                                        </p:tgtEl>
+                                        <p:attrNameLst>
+                                          <p:attrName>style.visibility</p:attrName>
+                                        </p:attrNameLst>
+                                      </p:cBhvr>
+                                      <p:to>
+                                        <p:strVal val="visible"/>
+                                      </p:to>
+                                    </p:set>
+                                  </p:childTnLst>
+                                </p:cTn>
+                              </p:par>
+                              <p:par>
+                                <p:cTn id="139" presetID="1" presetClass="entr" presetSubtype="0" fill="hold" nodeType="withEffect">
+                                  <p:stCondLst>
+                                    <p:cond delay="0"/>
+                                  </p:stCondLst>
+                                  <p:childTnLst>
+                                    <p:set>
+                                      <p:cBhvr>
+                                        <p:cTn id="140" dur="1" fill="hold">
+                                          <p:stCondLst>
+                                            <p:cond delay="0"/>
+                                          </p:stCondLst>
+                                        </p:cTn>
+                                        <p:tgtEl>
+                                          <p:spTgt spid="105"/>
                                         </p:tgtEl>
                                         <p:attrNameLst>
                                           <p:attrName>style.visibility</p:attrName>
@@ -13195,6 +13465,73 @@
           </a:p>
         </p:txBody>
       </p:sp>
+      <p:pic>
+        <p:nvPicPr>
+          <p:cNvPr id="3" name="Grafik 2">
+            <a:extLst>
+              <a:ext uri="{FF2B5EF4-FFF2-40B4-BE49-F238E27FC236}">
+                <a16:creationId xmlns:a16="http://schemas.microsoft.com/office/drawing/2014/main" id="{C07EF1FA-7D58-42EF-9CFB-65017FFF6FEC}"/>
+              </a:ext>
+            </a:extLst>
+          </p:cNvPr>
+          <p:cNvPicPr>
+            <a:picLocks noChangeAspect="1"/>
+          </p:cNvPicPr>
+          <p:nvPr/>
+        </p:nvPicPr>
+        <p:blipFill rotWithShape="1">
+          <a:blip r:embed="rId2">
+            <a:extLst>
+              <a:ext uri="{28A0092B-C50C-407E-A947-70E740481C1C}">
+                <a14:useLocalDpi xmlns:a14="http://schemas.microsoft.com/office/drawing/2010/main" val="0"/>
+              </a:ext>
+            </a:extLst>
+          </a:blip>
+          <a:srcRect l="18130" r="14600" b="9167"/>
+          <a:stretch/>
+        </p:blipFill>
+        <p:spPr>
+          <a:xfrm>
+            <a:off x="4032514" y="559492"/>
+            <a:ext cx="5190836" cy="5739015"/>
+          </a:xfrm>
+          <a:prstGeom prst="rect">
+            <a:avLst/>
+          </a:prstGeom>
+          <a:solidFill>
+            <a:srgbClr val="FFFFFF">
+              <a:shade val="85000"/>
+            </a:srgbClr>
+          </a:solidFill>
+          <a:ln w="190500" cap="sq">
+            <a:solidFill>
+              <a:srgbClr val="FFFFFF"/>
+            </a:solidFill>
+            <a:miter lim="800000"/>
+          </a:ln>
+          <a:effectLst>
+            <a:outerShdw blurRad="65000" dist="50800" dir="12900000" kx="195000" ky="145000" algn="tl" rotWithShape="0">
+              <a:srgbClr val="000000">
+                <a:alpha val="30000"/>
+              </a:srgbClr>
+            </a:outerShdw>
+          </a:effectLst>
+          <a:scene3d>
+            <a:camera prst="orthographicFront">
+              <a:rot lat="0" lon="0" rev="360000"/>
+            </a:camera>
+            <a:lightRig rig="twoPt" dir="t">
+              <a:rot lat="0" lon="0" rev="7200000"/>
+            </a:lightRig>
+          </a:scene3d>
+          <a:sp3d contourW="12700">
+            <a:bevelT w="25400" h="19050"/>
+            <a:contourClr>
+              <a:srgbClr val="969696"/>
+            </a:contourClr>
+          </a:sp3d>
+        </p:spPr>
+      </p:pic>
       <p:sp>
         <p:nvSpPr>
           <p:cNvPr id="4" name="Titel 1">
@@ -13290,36 +13627,6 @@
           </a:p>
         </p:txBody>
       </p:sp>
-      <p:pic>
-        <p:nvPicPr>
-          <p:cNvPr id="5" name="Grafik 4">
-            <a:extLst>
-              <a:ext uri="{FF2B5EF4-FFF2-40B4-BE49-F238E27FC236}">
-                <a16:creationId xmlns:a16="http://schemas.microsoft.com/office/drawing/2014/main" id="{1B2D998D-EAB3-44CC-A3B6-AACF450133F7}"/>
-              </a:ext>
-            </a:extLst>
-          </p:cNvPr>
-          <p:cNvPicPr>
-            <a:picLocks noChangeAspect="1"/>
-          </p:cNvPicPr>
-          <p:nvPr/>
-        </p:nvPicPr>
-        <p:blipFill>
-          <a:blip r:embed="rId2"/>
-          <a:stretch>
-            <a:fillRect/>
-          </a:stretch>
-        </p:blipFill>
-        <p:spPr>
-          <a:xfrm>
-            <a:off x="3608772" y="782192"/>
-            <a:ext cx="6449629" cy="5304821"/>
-          </a:xfrm>
-          <a:prstGeom prst="rect">
-            <a:avLst/>
-          </a:prstGeom>
-        </p:spPr>
-      </p:pic>
       <p:pic>
         <p:nvPicPr>
           <p:cNvPr id="39" name="Grafik 38" descr="Logo Ingenieursinformatik">
@@ -13551,11 +13858,12 @@
           <a:prstGeom prst="rect">
             <a:avLst/>
           </a:prstGeom>
-          <a:ln w="22225">
-            <a:solidFill>
-              <a:schemeClr val="tx1"/>
-            </a:solidFill>
+          <a:ln>
+            <a:noFill/>
           </a:ln>
+          <a:effectLst>
+            <a:softEdge rad="112500"/>
+          </a:effectLst>
         </p:spPr>
       </p:pic>
     </p:spTree>
@@ -13675,25 +13983,51 @@
           </p:cNvPicPr>
           <p:nvPr/>
         </p:nvPicPr>
-        <p:blipFill>
+        <p:blipFill rotWithShape="1">
           <a:blip r:embed="rId2"/>
-          <a:stretch>
-            <a:fillRect/>
-          </a:stretch>
+          <a:srcRect r="7008" b="14565"/>
+          <a:stretch/>
         </p:blipFill>
         <p:spPr>
           <a:xfrm>
-            <a:off x="3772629" y="1445183"/>
-            <a:ext cx="6769443" cy="4924770"/>
+            <a:off x="3652556" y="1121910"/>
+            <a:ext cx="7207059" cy="4817072"/>
           </a:xfrm>
           <a:prstGeom prst="rect">
             <a:avLst/>
           </a:prstGeom>
-          <a:ln w="22225">
+          <a:solidFill>
+            <a:srgbClr val="FFFFFF">
+              <a:shade val="85000"/>
+            </a:srgbClr>
+          </a:solidFill>
+          <a:ln w="190500" cap="sq">
             <a:solidFill>
-              <a:schemeClr val="tx1"/>
+              <a:srgbClr val="FFFFFF"/>
             </a:solidFill>
+            <a:miter lim="800000"/>
           </a:ln>
+          <a:effectLst>
+            <a:outerShdw blurRad="65000" dist="50800" dir="12900000" kx="195000" ky="145000" algn="tl" rotWithShape="0">
+              <a:srgbClr val="000000">
+                <a:alpha val="30000"/>
+              </a:srgbClr>
+            </a:outerShdw>
+          </a:effectLst>
+          <a:scene3d>
+            <a:camera prst="orthographicFront">
+              <a:rot lat="0" lon="0" rev="360000"/>
+            </a:camera>
+            <a:lightRig rig="twoPt" dir="t">
+              <a:rot lat="0" lon="0" rev="7200000"/>
+            </a:lightRig>
+          </a:scene3d>
+          <a:sp3d contourW="12700">
+            <a:bevelT w="25400" h="19050"/>
+            <a:contourClr>
+              <a:srgbClr val="969696"/>
+            </a:contourClr>
+          </a:sp3d>
         </p:spPr>
       </p:pic>
       <p:pic>

</xml_diff>